<commit_message>
Signed-off-by: Rafael Souza <rafael45m@gmail.com>
</commit_message>
<xml_diff>
--- a/Slides/Progressão UFBA.pptx
+++ b/Slides/Progressão UFBA.pptx
@@ -13,10 +13,10 @@
     <p:sldId id="279" r:id="rId4"/>
     <p:sldId id="280" r:id="rId5"/>
     <p:sldId id="286" r:id="rId6"/>
-    <p:sldId id="282" r:id="rId7"/>
-    <p:sldId id="287" r:id="rId8"/>
-    <p:sldId id="281" r:id="rId9"/>
-    <p:sldId id="288" r:id="rId10"/>
+    <p:sldId id="288" r:id="rId7"/>
+    <p:sldId id="282" r:id="rId8"/>
+    <p:sldId id="287" r:id="rId9"/>
+    <p:sldId id="281" r:id="rId10"/>
     <p:sldId id="283" r:id="rId11"/>
     <p:sldId id="284" r:id="rId12"/>
   </p:sldIdLst>
@@ -265,7 +265,7 @@
         <p:nvSpPr>
           <p:cNvPr id="81924" name="Rectangle 4"/>
           <p:cNvSpPr>
-            <a:spLocks noRot="1" noChangeArrowheads="1" noTextEdit="1"/>
+            <a:spLocks noGrp="1" noRot="1" noChangeAspect="1" noChangeArrowheads="1" noTextEdit="1"/>
           </p:cNvSpPr>
           <p:nvPr>
             <p:ph type="sldImg" idx="2"/>
@@ -628,7 +628,7 @@
         <p:nvSpPr>
           <p:cNvPr id="107522" name="Rectangle 2"/>
           <p:cNvSpPr>
-            <a:spLocks noRot="1" noChangeArrowheads="1" noTextEdit="1"/>
+            <a:spLocks noGrp="1" noRot="1" noChangeAspect="1" noChangeArrowheads="1" noTextEdit="1"/>
           </p:cNvSpPr>
           <p:nvPr>
             <p:ph type="sldImg"/>
@@ -712,7 +712,7 @@
         <p:nvSpPr>
           <p:cNvPr id="112642" name="Rectangle 2"/>
           <p:cNvSpPr>
-            <a:spLocks noRot="1" noChangeArrowheads="1" noTextEdit="1"/>
+            <a:spLocks noGrp="1" noRot="1" noChangeAspect="1" noChangeArrowheads="1" noTextEdit="1"/>
           </p:cNvSpPr>
           <p:nvPr>
             <p:ph type="sldImg"/>
@@ -796,7 +796,7 @@
         <p:nvSpPr>
           <p:cNvPr id="112642" name="Rectangle 2"/>
           <p:cNvSpPr>
-            <a:spLocks noRot="1" noChangeArrowheads="1" noTextEdit="1"/>
+            <a:spLocks noGrp="1" noRot="1" noChangeAspect="1" noChangeArrowheads="1" noTextEdit="1"/>
           </p:cNvSpPr>
           <p:nvPr>
             <p:ph type="sldImg"/>
@@ -880,7 +880,7 @@
         <p:nvSpPr>
           <p:cNvPr id="112642" name="Rectangle 2"/>
           <p:cNvSpPr>
-            <a:spLocks noRot="1" noChangeArrowheads="1" noTextEdit="1"/>
+            <a:spLocks noGrp="1" noRot="1" noChangeAspect="1" noChangeArrowheads="1" noTextEdit="1"/>
           </p:cNvSpPr>
           <p:nvPr>
             <p:ph type="sldImg"/>
@@ -964,7 +964,7 @@
         <p:nvSpPr>
           <p:cNvPr id="110594" name="Rectangle 2"/>
           <p:cNvSpPr>
-            <a:spLocks noRot="1" noChangeArrowheads="1" noTextEdit="1"/>
+            <a:spLocks noGrp="1" noRot="1" noChangeAspect="1" noChangeArrowheads="1" noTextEdit="1"/>
           </p:cNvSpPr>
           <p:nvPr>
             <p:ph type="sldImg"/>
@@ -1048,7 +1048,7 @@
         <p:nvSpPr>
           <p:cNvPr id="112642" name="Rectangle 2"/>
           <p:cNvSpPr>
-            <a:spLocks noRot="1" noChangeArrowheads="1" noTextEdit="1"/>
+            <a:spLocks noGrp="1" noRot="1" noChangeAspect="1" noChangeArrowheads="1" noTextEdit="1"/>
           </p:cNvSpPr>
           <p:nvPr>
             <p:ph type="sldImg"/>
@@ -1132,7 +1132,7 @@
         <p:nvSpPr>
           <p:cNvPr id="110594" name="Rectangle 2"/>
           <p:cNvSpPr>
-            <a:spLocks noRot="1" noChangeArrowheads="1" noTextEdit="1"/>
+            <a:spLocks noGrp="1" noRot="1" noChangeAspect="1" noChangeArrowheads="1" noTextEdit="1"/>
           </p:cNvSpPr>
           <p:nvPr>
             <p:ph type="sldImg"/>
@@ -1203,7 +1203,7 @@
           <a:bodyPr/>
           <a:lstStyle/>
           <a:p>
-            <a:fld id="{DC4CCFB1-2F0F-4CDC-A016-767C6895DC49}" type="slidenum">
+            <a:fld id="{CAFB6AB3-CD92-4DCA-9FCB-71137AA0857E}" type="slidenum">
               <a:rPr lang="en-US"/>
               <a:pPr/>
               <a:t>6</a:t>
@@ -1214,9 +1214,9 @@
       </p:sp>
       <p:sp>
         <p:nvSpPr>
-          <p:cNvPr id="112642" name="Rectangle 2"/>
-          <p:cNvSpPr>
-            <a:spLocks noRot="1" noChangeArrowheads="1" noTextEdit="1"/>
+          <p:cNvPr id="110594" name="Rectangle 2"/>
+          <p:cNvSpPr>
+            <a:spLocks noGrp="1" noRot="1" noChangeAspect="1" noChangeArrowheads="1" noTextEdit="1"/>
           </p:cNvSpPr>
           <p:nvPr>
             <p:ph type="sldImg"/>
@@ -1228,7 +1228,7 @@
       </p:sp>
       <p:sp>
         <p:nvSpPr>
-          <p:cNvPr id="112643" name="Rectangle 3"/>
+          <p:cNvPr id="110595" name="Rectangle 3"/>
           <p:cNvSpPr>
             <a:spLocks noGrp="1" noChangeArrowheads="1"/>
           </p:cNvSpPr>
@@ -1287,7 +1287,7 @@
           <a:bodyPr/>
           <a:lstStyle/>
           <a:p>
-            <a:fld id="{CAFB6AB3-CD92-4DCA-9FCB-71137AA0857E}" type="slidenum">
+            <a:fld id="{DC4CCFB1-2F0F-4CDC-A016-767C6895DC49}" type="slidenum">
               <a:rPr lang="en-US"/>
               <a:pPr/>
               <a:t>7</a:t>
@@ -1298,9 +1298,9 @@
       </p:sp>
       <p:sp>
         <p:nvSpPr>
-          <p:cNvPr id="110594" name="Rectangle 2"/>
-          <p:cNvSpPr>
-            <a:spLocks noRot="1" noChangeArrowheads="1" noTextEdit="1"/>
+          <p:cNvPr id="112642" name="Rectangle 2"/>
+          <p:cNvSpPr>
+            <a:spLocks noGrp="1" noRot="1" noChangeAspect="1" noChangeArrowheads="1" noTextEdit="1"/>
           </p:cNvSpPr>
           <p:nvPr>
             <p:ph type="sldImg"/>
@@ -1312,7 +1312,7 @@
       </p:sp>
       <p:sp>
         <p:nvSpPr>
-          <p:cNvPr id="110595" name="Rectangle 3"/>
+          <p:cNvPr id="112643" name="Rectangle 3"/>
           <p:cNvSpPr>
             <a:spLocks noGrp="1" noChangeArrowheads="1"/>
           </p:cNvSpPr>
@@ -1371,7 +1371,7 @@
           <a:bodyPr/>
           <a:lstStyle/>
           <a:p>
-            <a:fld id="{DC4CCFB1-2F0F-4CDC-A016-767C6895DC49}" type="slidenum">
+            <a:fld id="{CAFB6AB3-CD92-4DCA-9FCB-71137AA0857E}" type="slidenum">
               <a:rPr lang="en-US"/>
               <a:pPr/>
               <a:t>8</a:t>
@@ -1382,9 +1382,9 @@
       </p:sp>
       <p:sp>
         <p:nvSpPr>
-          <p:cNvPr id="112642" name="Rectangle 2"/>
-          <p:cNvSpPr>
-            <a:spLocks noRot="1" noChangeArrowheads="1" noTextEdit="1"/>
+          <p:cNvPr id="110594" name="Rectangle 2"/>
+          <p:cNvSpPr>
+            <a:spLocks noGrp="1" noRot="1" noChangeAspect="1" noChangeArrowheads="1" noTextEdit="1"/>
           </p:cNvSpPr>
           <p:nvPr>
             <p:ph type="sldImg"/>
@@ -1396,7 +1396,7 @@
       </p:sp>
       <p:sp>
         <p:nvSpPr>
-          <p:cNvPr id="112643" name="Rectangle 3"/>
+          <p:cNvPr id="110595" name="Rectangle 3"/>
           <p:cNvSpPr>
             <a:spLocks noGrp="1" noChangeArrowheads="1"/>
           </p:cNvSpPr>
@@ -1455,7 +1455,7 @@
           <a:bodyPr/>
           <a:lstStyle/>
           <a:p>
-            <a:fld id="{CAFB6AB3-CD92-4DCA-9FCB-71137AA0857E}" type="slidenum">
+            <a:fld id="{DC4CCFB1-2F0F-4CDC-A016-767C6895DC49}" type="slidenum">
               <a:rPr lang="en-US"/>
               <a:pPr/>
               <a:t>9</a:t>
@@ -1466,9 +1466,9 @@
       </p:sp>
       <p:sp>
         <p:nvSpPr>
-          <p:cNvPr id="110594" name="Rectangle 2"/>
-          <p:cNvSpPr>
-            <a:spLocks noRot="1" noChangeArrowheads="1" noTextEdit="1"/>
+          <p:cNvPr id="112642" name="Rectangle 2"/>
+          <p:cNvSpPr>
+            <a:spLocks noGrp="1" noRot="1" noChangeAspect="1" noChangeArrowheads="1" noTextEdit="1"/>
           </p:cNvSpPr>
           <p:nvPr>
             <p:ph type="sldImg"/>
@@ -1480,7 +1480,7 @@
       </p:sp>
       <p:sp>
         <p:nvSpPr>
-          <p:cNvPr id="110595" name="Rectangle 3"/>
+          <p:cNvPr id="112643" name="Rectangle 3"/>
           <p:cNvSpPr>
             <a:spLocks noGrp="1" noChangeArrowheads="1"/>
           </p:cNvSpPr>
@@ -3992,13 +3992,18 @@
           <a:lstStyle/>
           <a:p>
             <a:r>
-              <a:rPr lang="en-US" dirty="0">
+              <a:rPr lang="pt-BR" dirty="0" smtClean="0">
                 <a:solidFill>
                   <a:schemeClr val="tx2"/>
                 </a:solidFill>
               </a:rPr>
-              <a:t>Print master</a:t>
-            </a:r>
+              <a:t>Introdução</a:t>
+            </a:r>
+            <a:endParaRPr lang="pt-BR" dirty="0">
+              <a:solidFill>
+                <a:schemeClr val="tx2"/>
+              </a:solidFill>
+            </a:endParaRPr>
           </a:p>
         </p:txBody>
       </p:sp>
@@ -4015,7 +4020,7 @@
         <p:spPr>
           <a:xfrm>
             <a:off x="1981200" y="1981200"/>
-            <a:ext cx="6934200" cy="4267200"/>
+            <a:ext cx="6263208" cy="4267200"/>
           </a:xfrm>
         </p:spPr>
         <p:txBody>
@@ -4026,1471 +4031,78 @@
               <a:lnSpc>
                 <a:spcPct val="80000"/>
               </a:lnSpc>
+              <a:buNone/>
             </a:pPr>
             <a:r>
-              <a:rPr lang="en-US" altLang="ko-KR" sz="1800" dirty="0">
+              <a:rPr lang="pt-BR" sz="1800" dirty="0" smtClean="0">
                 <a:solidFill>
-                  <a:schemeClr val="tx2"/>
+                  <a:schemeClr val="tx1"/>
                 </a:solidFill>
-                <a:latin typeface="Verdana" pitchFamily="34" charset="0"/>
-                <a:ea typeface="굴림" charset="-127"/>
               </a:rPr>
-              <a:t>Your Text here</a:t>
-            </a:r>
-          </a:p>
-          <a:p>
-            <a:pPr>
+              <a:t>	</a:t>
+            </a:r>
+          </a:p>
+          <a:p>
+            <a:pPr algn="just">
               <a:lnSpc>
                 <a:spcPct val="80000"/>
               </a:lnSpc>
             </a:pPr>
-            <a:endParaRPr lang="en-US" altLang="ko-KR" sz="1800" dirty="0">
+            <a:r>
+              <a:rPr lang="pt-BR" sz="2400" dirty="0" smtClean="0">
+                <a:solidFill>
+                  <a:schemeClr val="tx1"/>
+                </a:solidFill>
+              </a:rPr>
+              <a:t>Progressão Acadêmica</a:t>
+            </a:r>
+            <a:endParaRPr lang="pt-BR" sz="2400" dirty="0" smtClean="0">
               <a:solidFill>
-                <a:schemeClr val="tx2"/>
+                <a:schemeClr val="tx1"/>
               </a:solidFill>
-              <a:latin typeface="Verdana" pitchFamily="34" charset="0"/>
-              <a:ea typeface="굴림" charset="-127"/>
             </a:endParaRPr>
           </a:p>
           <a:p>
-            <a:pPr>
+            <a:pPr algn="just">
               <a:lnSpc>
                 <a:spcPct val="80000"/>
               </a:lnSpc>
             </a:pPr>
             <a:r>
-              <a:rPr lang="en-US" altLang="ko-KR" sz="1800" dirty="0" err="1">
+              <a:rPr lang="pt-BR" sz="2400" dirty="0" smtClean="0">
                 <a:solidFill>
-                  <a:schemeClr val="tx2"/>
+                  <a:schemeClr val="tx1"/>
                 </a:solidFill>
-                <a:latin typeface="Verdana" pitchFamily="34" charset="0"/>
-                <a:ea typeface="굴림" charset="-127"/>
               </a:rPr>
-              <a:t>Lorem</a:t>
-            </a:r>
-            <a:r>
-              <a:rPr lang="en-US" altLang="ko-KR" sz="1800" dirty="0">
-                <a:solidFill>
-                  <a:schemeClr val="tx2"/>
-                </a:solidFill>
-                <a:latin typeface="Verdana" pitchFamily="34" charset="0"/>
-                <a:ea typeface="굴림" charset="-127"/>
-              </a:rPr>
-              <a:t> </a:t>
-            </a:r>
-            <a:r>
-              <a:rPr lang="en-US" altLang="ko-KR" sz="1800" dirty="0" err="1">
-                <a:solidFill>
-                  <a:schemeClr val="tx2"/>
-                </a:solidFill>
-                <a:latin typeface="Verdana" pitchFamily="34" charset="0"/>
-                <a:ea typeface="굴림" charset="-127"/>
-              </a:rPr>
-              <a:t>ipsum</a:t>
-            </a:r>
-            <a:r>
-              <a:rPr lang="en-US" altLang="ko-KR" sz="1800" dirty="0">
-                <a:solidFill>
-                  <a:schemeClr val="tx2"/>
-                </a:solidFill>
-                <a:latin typeface="Verdana" pitchFamily="34" charset="0"/>
-                <a:ea typeface="굴림" charset="-127"/>
-              </a:rPr>
-              <a:t> dolor sit </a:t>
-            </a:r>
-            <a:r>
-              <a:rPr lang="en-US" altLang="ko-KR" sz="1800" dirty="0" err="1">
-                <a:solidFill>
-                  <a:schemeClr val="tx2"/>
-                </a:solidFill>
-                <a:latin typeface="Verdana" pitchFamily="34" charset="0"/>
-                <a:ea typeface="굴림" charset="-127"/>
-              </a:rPr>
-              <a:t>amet</a:t>
-            </a:r>
-            <a:r>
-              <a:rPr lang="en-US" altLang="ko-KR" sz="1800" dirty="0">
-                <a:solidFill>
-                  <a:schemeClr val="tx2"/>
-                </a:solidFill>
-                <a:latin typeface="Verdana" pitchFamily="34" charset="0"/>
-                <a:ea typeface="굴림" charset="-127"/>
-              </a:rPr>
-              <a:t>, </a:t>
-            </a:r>
-            <a:r>
-              <a:rPr lang="en-US" altLang="ko-KR" sz="1800" dirty="0" err="1">
-                <a:solidFill>
-                  <a:schemeClr val="tx2"/>
-                </a:solidFill>
-                <a:latin typeface="Verdana" pitchFamily="34" charset="0"/>
-                <a:ea typeface="굴림" charset="-127"/>
-              </a:rPr>
-              <a:t>consectetuer</a:t>
-            </a:r>
-            <a:r>
-              <a:rPr lang="en-US" altLang="ko-KR" sz="1800" dirty="0">
-                <a:solidFill>
-                  <a:schemeClr val="tx2"/>
-                </a:solidFill>
-                <a:latin typeface="Verdana" pitchFamily="34" charset="0"/>
-                <a:ea typeface="굴림" charset="-127"/>
-              </a:rPr>
-              <a:t> </a:t>
-            </a:r>
-            <a:r>
-              <a:rPr lang="en-US" altLang="ko-KR" sz="1800" dirty="0" err="1">
-                <a:solidFill>
-                  <a:schemeClr val="tx2"/>
-                </a:solidFill>
-                <a:latin typeface="Verdana" pitchFamily="34" charset="0"/>
-                <a:ea typeface="굴림" charset="-127"/>
-              </a:rPr>
-              <a:t>adipiscing</a:t>
-            </a:r>
-            <a:r>
-              <a:rPr lang="en-US" altLang="ko-KR" sz="1800" dirty="0">
-                <a:solidFill>
-                  <a:schemeClr val="tx2"/>
-                </a:solidFill>
-                <a:latin typeface="Verdana" pitchFamily="34" charset="0"/>
-                <a:ea typeface="굴림" charset="-127"/>
-              </a:rPr>
-              <a:t> </a:t>
-            </a:r>
-            <a:r>
-              <a:rPr lang="en-US" altLang="ko-KR" sz="1800" dirty="0" err="1">
-                <a:solidFill>
-                  <a:schemeClr val="tx2"/>
-                </a:solidFill>
-                <a:latin typeface="Verdana" pitchFamily="34" charset="0"/>
-                <a:ea typeface="굴림" charset="-127"/>
-              </a:rPr>
-              <a:t>elit</a:t>
-            </a:r>
-            <a:r>
-              <a:rPr lang="en-US" altLang="ko-KR" sz="1800" dirty="0">
-                <a:solidFill>
-                  <a:schemeClr val="tx2"/>
-                </a:solidFill>
-                <a:latin typeface="Verdana" pitchFamily="34" charset="0"/>
-                <a:ea typeface="굴림" charset="-127"/>
-              </a:rPr>
-              <a:t>, </a:t>
-            </a:r>
-            <a:r>
-              <a:rPr lang="en-US" altLang="ko-KR" sz="1800" dirty="0" err="1">
-                <a:solidFill>
-                  <a:schemeClr val="tx2"/>
-                </a:solidFill>
-                <a:latin typeface="Verdana" pitchFamily="34" charset="0"/>
-                <a:ea typeface="굴림" charset="-127"/>
-              </a:rPr>
-              <a:t>sed</a:t>
-            </a:r>
-            <a:r>
-              <a:rPr lang="en-US" altLang="ko-KR" sz="1800" dirty="0">
-                <a:solidFill>
-                  <a:schemeClr val="tx2"/>
-                </a:solidFill>
-                <a:latin typeface="Verdana" pitchFamily="34" charset="0"/>
-                <a:ea typeface="굴림" charset="-127"/>
-              </a:rPr>
-              <a:t> </a:t>
-            </a:r>
-            <a:r>
-              <a:rPr lang="en-US" altLang="ko-KR" sz="1800" dirty="0" err="1">
-                <a:solidFill>
-                  <a:schemeClr val="tx2"/>
-                </a:solidFill>
-                <a:latin typeface="Verdana" pitchFamily="34" charset="0"/>
-                <a:ea typeface="굴림" charset="-127"/>
-              </a:rPr>
-              <a:t>diam</a:t>
-            </a:r>
-            <a:r>
-              <a:rPr lang="en-US" altLang="ko-KR" sz="1800" dirty="0">
-                <a:solidFill>
-                  <a:schemeClr val="tx2"/>
-                </a:solidFill>
-                <a:latin typeface="Verdana" pitchFamily="34" charset="0"/>
-                <a:ea typeface="굴림" charset="-127"/>
-              </a:rPr>
-              <a:t> </a:t>
-            </a:r>
-            <a:r>
-              <a:rPr lang="en-US" altLang="ko-KR" sz="1800" dirty="0" err="1">
-                <a:solidFill>
-                  <a:schemeClr val="tx2"/>
-                </a:solidFill>
-                <a:latin typeface="Verdana" pitchFamily="34" charset="0"/>
-                <a:ea typeface="굴림" charset="-127"/>
-              </a:rPr>
-              <a:t>nonummy</a:t>
-            </a:r>
-            <a:r>
-              <a:rPr lang="en-US" altLang="ko-KR" sz="1800" dirty="0">
-                <a:solidFill>
-                  <a:schemeClr val="tx2"/>
-                </a:solidFill>
-                <a:latin typeface="Verdana" pitchFamily="34" charset="0"/>
-                <a:ea typeface="굴림" charset="-127"/>
-              </a:rPr>
-              <a:t> </a:t>
-            </a:r>
-            <a:r>
-              <a:rPr lang="en-US" altLang="ko-KR" sz="1800" dirty="0" err="1">
-                <a:solidFill>
-                  <a:schemeClr val="tx2"/>
-                </a:solidFill>
-                <a:latin typeface="Verdana" pitchFamily="34" charset="0"/>
-                <a:ea typeface="굴림" charset="-127"/>
-              </a:rPr>
-              <a:t>nibh</a:t>
-            </a:r>
-            <a:r>
-              <a:rPr lang="en-US" altLang="ko-KR" sz="1800" dirty="0">
-                <a:solidFill>
-                  <a:schemeClr val="tx2"/>
-                </a:solidFill>
-                <a:latin typeface="Verdana" pitchFamily="34" charset="0"/>
-                <a:ea typeface="굴림" charset="-127"/>
-              </a:rPr>
-              <a:t> </a:t>
-            </a:r>
-            <a:r>
-              <a:rPr lang="en-US" altLang="ko-KR" sz="1800" dirty="0" err="1">
-                <a:solidFill>
-                  <a:schemeClr val="tx2"/>
-                </a:solidFill>
-                <a:latin typeface="Verdana" pitchFamily="34" charset="0"/>
-                <a:ea typeface="굴림" charset="-127"/>
-              </a:rPr>
-              <a:t>euismod</a:t>
-            </a:r>
-            <a:r>
-              <a:rPr lang="en-US" altLang="ko-KR" sz="1800" dirty="0">
-                <a:solidFill>
-                  <a:schemeClr val="tx2"/>
-                </a:solidFill>
-                <a:latin typeface="Verdana" pitchFamily="34" charset="0"/>
-                <a:ea typeface="굴림" charset="-127"/>
-              </a:rPr>
-              <a:t> </a:t>
-            </a:r>
-            <a:r>
-              <a:rPr lang="en-US" altLang="ko-KR" sz="1800" dirty="0" err="1">
-                <a:solidFill>
-                  <a:schemeClr val="tx2"/>
-                </a:solidFill>
-                <a:latin typeface="Verdana" pitchFamily="34" charset="0"/>
-                <a:ea typeface="굴림" charset="-127"/>
-              </a:rPr>
-              <a:t>tincidunt</a:t>
-            </a:r>
-            <a:r>
-              <a:rPr lang="en-US" altLang="ko-KR" sz="1800" dirty="0">
-                <a:solidFill>
-                  <a:schemeClr val="tx2"/>
-                </a:solidFill>
-                <a:latin typeface="Verdana" pitchFamily="34" charset="0"/>
-                <a:ea typeface="굴림" charset="-127"/>
-              </a:rPr>
-              <a:t> </a:t>
-            </a:r>
-            <a:r>
-              <a:rPr lang="en-US" altLang="ko-KR" sz="1800" dirty="0" err="1">
-                <a:solidFill>
-                  <a:schemeClr val="tx2"/>
-                </a:solidFill>
-                <a:latin typeface="Verdana" pitchFamily="34" charset="0"/>
-                <a:ea typeface="굴림" charset="-127"/>
-              </a:rPr>
-              <a:t>ut</a:t>
-            </a:r>
-            <a:r>
-              <a:rPr lang="en-US" altLang="ko-KR" sz="1800" dirty="0">
-                <a:solidFill>
-                  <a:schemeClr val="tx2"/>
-                </a:solidFill>
-                <a:latin typeface="Verdana" pitchFamily="34" charset="0"/>
-                <a:ea typeface="굴림" charset="-127"/>
-              </a:rPr>
-              <a:t> </a:t>
-            </a:r>
-            <a:r>
-              <a:rPr lang="en-US" altLang="ko-KR" sz="1800" dirty="0" err="1">
-                <a:solidFill>
-                  <a:schemeClr val="tx2"/>
-                </a:solidFill>
-                <a:latin typeface="Verdana" pitchFamily="34" charset="0"/>
-                <a:ea typeface="굴림" charset="-127"/>
-              </a:rPr>
-              <a:t>laoreet</a:t>
-            </a:r>
-            <a:r>
-              <a:rPr lang="en-US" altLang="ko-KR" sz="1800" dirty="0">
-                <a:solidFill>
-                  <a:schemeClr val="tx2"/>
-                </a:solidFill>
-                <a:latin typeface="Verdana" pitchFamily="34" charset="0"/>
-                <a:ea typeface="굴림" charset="-127"/>
-              </a:rPr>
-              <a:t> </a:t>
-            </a:r>
-            <a:r>
-              <a:rPr lang="en-US" altLang="ko-KR" sz="1800" dirty="0" err="1">
-                <a:solidFill>
-                  <a:schemeClr val="tx2"/>
-                </a:solidFill>
-                <a:latin typeface="Verdana" pitchFamily="34" charset="0"/>
-                <a:ea typeface="굴림" charset="-127"/>
-              </a:rPr>
-              <a:t>dolore</a:t>
-            </a:r>
-            <a:r>
-              <a:rPr lang="en-US" altLang="ko-KR" sz="1800" dirty="0">
-                <a:solidFill>
-                  <a:schemeClr val="tx2"/>
-                </a:solidFill>
-                <a:latin typeface="Verdana" pitchFamily="34" charset="0"/>
-                <a:ea typeface="굴림" charset="-127"/>
-              </a:rPr>
-              <a:t> magna </a:t>
-            </a:r>
-            <a:r>
-              <a:rPr lang="en-US" altLang="ko-KR" sz="1800" dirty="0" err="1">
-                <a:solidFill>
-                  <a:schemeClr val="tx2"/>
-                </a:solidFill>
-                <a:latin typeface="Verdana" pitchFamily="34" charset="0"/>
-                <a:ea typeface="굴림" charset="-127"/>
-              </a:rPr>
-              <a:t>aliquam</a:t>
-            </a:r>
-            <a:r>
-              <a:rPr lang="en-US" altLang="ko-KR" sz="1800" dirty="0">
-                <a:solidFill>
-                  <a:schemeClr val="tx2"/>
-                </a:solidFill>
-                <a:latin typeface="Verdana" pitchFamily="34" charset="0"/>
-                <a:ea typeface="굴림" charset="-127"/>
-              </a:rPr>
-              <a:t> </a:t>
-            </a:r>
-            <a:r>
-              <a:rPr lang="en-US" altLang="ko-KR" sz="1800" dirty="0" err="1">
-                <a:solidFill>
-                  <a:schemeClr val="tx2"/>
-                </a:solidFill>
-                <a:latin typeface="Verdana" pitchFamily="34" charset="0"/>
-                <a:ea typeface="굴림" charset="-127"/>
-              </a:rPr>
-              <a:t>erat</a:t>
-            </a:r>
-            <a:r>
-              <a:rPr lang="en-US" altLang="ko-KR" sz="1800" dirty="0">
-                <a:solidFill>
-                  <a:schemeClr val="tx2"/>
-                </a:solidFill>
-                <a:latin typeface="Verdana" pitchFamily="34" charset="0"/>
-                <a:ea typeface="굴림" charset="-127"/>
-              </a:rPr>
-              <a:t> </a:t>
-            </a:r>
-            <a:r>
-              <a:rPr lang="en-US" altLang="ko-KR" sz="1800" dirty="0" err="1">
-                <a:solidFill>
-                  <a:schemeClr val="tx2"/>
-                </a:solidFill>
-                <a:latin typeface="Verdana" pitchFamily="34" charset="0"/>
-                <a:ea typeface="굴림" charset="-127"/>
-              </a:rPr>
-              <a:t>volutpat</a:t>
-            </a:r>
-            <a:r>
-              <a:rPr lang="en-US" altLang="ko-KR" sz="1800" dirty="0">
-                <a:solidFill>
-                  <a:schemeClr val="tx2"/>
-                </a:solidFill>
-                <a:latin typeface="Verdana" pitchFamily="34" charset="0"/>
-                <a:ea typeface="굴림" charset="-127"/>
-              </a:rPr>
-              <a:t>. </a:t>
-            </a:r>
-            <a:r>
-              <a:rPr lang="en-US" altLang="ko-KR" sz="1800" dirty="0" err="1">
-                <a:solidFill>
-                  <a:schemeClr val="tx2"/>
-                </a:solidFill>
-                <a:latin typeface="Verdana" pitchFamily="34" charset="0"/>
-                <a:ea typeface="굴림" charset="-127"/>
-              </a:rPr>
-              <a:t>Ut</a:t>
-            </a:r>
-            <a:r>
-              <a:rPr lang="en-US" altLang="ko-KR" sz="1800" dirty="0">
-                <a:solidFill>
-                  <a:schemeClr val="tx2"/>
-                </a:solidFill>
-                <a:latin typeface="Verdana" pitchFamily="34" charset="0"/>
-                <a:ea typeface="굴림" charset="-127"/>
-              </a:rPr>
-              <a:t> </a:t>
-            </a:r>
-            <a:r>
-              <a:rPr lang="en-US" altLang="ko-KR" sz="1800" dirty="0" err="1">
-                <a:solidFill>
-                  <a:schemeClr val="tx2"/>
-                </a:solidFill>
-                <a:latin typeface="Verdana" pitchFamily="34" charset="0"/>
-                <a:ea typeface="굴림" charset="-127"/>
-              </a:rPr>
-              <a:t>wisi</a:t>
-            </a:r>
-            <a:r>
-              <a:rPr lang="en-US" altLang="ko-KR" sz="1800" dirty="0">
-                <a:solidFill>
-                  <a:schemeClr val="tx2"/>
-                </a:solidFill>
-                <a:latin typeface="Verdana" pitchFamily="34" charset="0"/>
-                <a:ea typeface="굴림" charset="-127"/>
-              </a:rPr>
-              <a:t> </a:t>
-            </a:r>
-            <a:r>
-              <a:rPr lang="en-US" altLang="ko-KR" sz="1800" dirty="0" err="1">
-                <a:solidFill>
-                  <a:schemeClr val="tx2"/>
-                </a:solidFill>
-                <a:latin typeface="Verdana" pitchFamily="34" charset="0"/>
-                <a:ea typeface="굴림" charset="-127"/>
-              </a:rPr>
-              <a:t>enim</a:t>
-            </a:r>
-            <a:r>
-              <a:rPr lang="en-US" altLang="ko-KR" sz="1800" dirty="0">
-                <a:solidFill>
-                  <a:schemeClr val="tx2"/>
-                </a:solidFill>
-                <a:latin typeface="Verdana" pitchFamily="34" charset="0"/>
-                <a:ea typeface="굴림" charset="-127"/>
-              </a:rPr>
-              <a:t> ad minim </a:t>
-            </a:r>
-            <a:r>
-              <a:rPr lang="en-US" altLang="ko-KR" sz="1800" dirty="0" err="1">
-                <a:solidFill>
-                  <a:schemeClr val="tx2"/>
-                </a:solidFill>
-                <a:latin typeface="Verdana" pitchFamily="34" charset="0"/>
-                <a:ea typeface="굴림" charset="-127"/>
-              </a:rPr>
-              <a:t>veniam</a:t>
-            </a:r>
-            <a:r>
-              <a:rPr lang="en-US" altLang="ko-KR" sz="1800" dirty="0">
-                <a:solidFill>
-                  <a:schemeClr val="tx2"/>
-                </a:solidFill>
-                <a:latin typeface="Verdana" pitchFamily="34" charset="0"/>
-                <a:ea typeface="굴림" charset="-127"/>
-              </a:rPr>
-              <a:t>, </a:t>
-            </a:r>
-            <a:r>
-              <a:rPr lang="en-US" altLang="ko-KR" sz="1800" dirty="0" err="1">
-                <a:solidFill>
-                  <a:schemeClr val="tx2"/>
-                </a:solidFill>
-                <a:latin typeface="Verdana" pitchFamily="34" charset="0"/>
-                <a:ea typeface="굴림" charset="-127"/>
-              </a:rPr>
-              <a:t>quis</a:t>
-            </a:r>
-            <a:r>
-              <a:rPr lang="en-US" altLang="ko-KR" sz="1800" dirty="0">
-                <a:solidFill>
-                  <a:schemeClr val="tx2"/>
-                </a:solidFill>
-                <a:latin typeface="Verdana" pitchFamily="34" charset="0"/>
-                <a:ea typeface="굴림" charset="-127"/>
-              </a:rPr>
-              <a:t> </a:t>
-            </a:r>
-            <a:r>
-              <a:rPr lang="en-US" altLang="ko-KR" sz="1800" dirty="0" err="1">
-                <a:solidFill>
-                  <a:schemeClr val="tx2"/>
-                </a:solidFill>
-                <a:latin typeface="Verdana" pitchFamily="34" charset="0"/>
-                <a:ea typeface="굴림" charset="-127"/>
-              </a:rPr>
-              <a:t>nostrud</a:t>
-            </a:r>
-            <a:r>
-              <a:rPr lang="en-US" altLang="ko-KR" sz="1800" dirty="0">
-                <a:solidFill>
-                  <a:schemeClr val="tx2"/>
-                </a:solidFill>
-                <a:latin typeface="Verdana" pitchFamily="34" charset="0"/>
-                <a:ea typeface="굴림" charset="-127"/>
-              </a:rPr>
-              <a:t> </a:t>
-            </a:r>
-            <a:r>
-              <a:rPr lang="en-US" altLang="ko-KR" sz="1800" dirty="0" err="1">
-                <a:solidFill>
-                  <a:schemeClr val="tx2"/>
-                </a:solidFill>
-                <a:latin typeface="Verdana" pitchFamily="34" charset="0"/>
-                <a:ea typeface="굴림" charset="-127"/>
-              </a:rPr>
-              <a:t>exerci</a:t>
-            </a:r>
-            <a:r>
-              <a:rPr lang="en-US" altLang="ko-KR" sz="1800" dirty="0">
-                <a:solidFill>
-                  <a:schemeClr val="tx2"/>
-                </a:solidFill>
-                <a:latin typeface="Verdana" pitchFamily="34" charset="0"/>
-                <a:ea typeface="굴림" charset="-127"/>
-              </a:rPr>
-              <a:t> </a:t>
-            </a:r>
-            <a:r>
-              <a:rPr lang="en-US" altLang="ko-KR" sz="1800" dirty="0" err="1">
-                <a:solidFill>
-                  <a:schemeClr val="tx2"/>
-                </a:solidFill>
-                <a:latin typeface="Verdana" pitchFamily="34" charset="0"/>
-                <a:ea typeface="굴림" charset="-127"/>
-              </a:rPr>
-              <a:t>tation</a:t>
-            </a:r>
-            <a:r>
-              <a:rPr lang="en-US" altLang="ko-KR" sz="1800" dirty="0">
-                <a:solidFill>
-                  <a:schemeClr val="tx2"/>
-                </a:solidFill>
-                <a:latin typeface="Verdana" pitchFamily="34" charset="0"/>
-                <a:ea typeface="굴림" charset="-127"/>
-              </a:rPr>
-              <a:t> </a:t>
-            </a:r>
-            <a:r>
-              <a:rPr lang="en-US" altLang="ko-KR" sz="1800" dirty="0" err="1">
-                <a:solidFill>
-                  <a:schemeClr val="tx2"/>
-                </a:solidFill>
-                <a:latin typeface="Verdana" pitchFamily="34" charset="0"/>
-                <a:ea typeface="굴림" charset="-127"/>
-              </a:rPr>
-              <a:t>ullamcorper</a:t>
-            </a:r>
-            <a:r>
-              <a:rPr lang="en-US" altLang="ko-KR" sz="1800" dirty="0">
-                <a:solidFill>
-                  <a:schemeClr val="tx2"/>
-                </a:solidFill>
-                <a:latin typeface="Verdana" pitchFamily="34" charset="0"/>
-                <a:ea typeface="굴림" charset="-127"/>
-              </a:rPr>
-              <a:t> </a:t>
-            </a:r>
-            <a:r>
-              <a:rPr lang="en-US" altLang="ko-KR" sz="1800" dirty="0" err="1">
-                <a:solidFill>
-                  <a:schemeClr val="tx2"/>
-                </a:solidFill>
-                <a:latin typeface="Verdana" pitchFamily="34" charset="0"/>
-                <a:ea typeface="굴림" charset="-127"/>
-              </a:rPr>
-              <a:t>suscipit</a:t>
-            </a:r>
-            <a:r>
-              <a:rPr lang="en-US" altLang="ko-KR" sz="1800" dirty="0">
-                <a:solidFill>
-                  <a:schemeClr val="tx2"/>
-                </a:solidFill>
-                <a:latin typeface="Verdana" pitchFamily="34" charset="0"/>
-                <a:ea typeface="굴림" charset="-127"/>
-              </a:rPr>
-              <a:t> </a:t>
-            </a:r>
-            <a:r>
-              <a:rPr lang="en-US" altLang="ko-KR" sz="1800" dirty="0" err="1">
-                <a:solidFill>
-                  <a:schemeClr val="tx2"/>
-                </a:solidFill>
-                <a:latin typeface="Verdana" pitchFamily="34" charset="0"/>
-                <a:ea typeface="굴림" charset="-127"/>
-              </a:rPr>
-              <a:t>lobortis</a:t>
-            </a:r>
-            <a:r>
-              <a:rPr lang="en-US" altLang="ko-KR" sz="1800" dirty="0">
-                <a:solidFill>
-                  <a:schemeClr val="tx2"/>
-                </a:solidFill>
-                <a:latin typeface="Verdana" pitchFamily="34" charset="0"/>
-                <a:ea typeface="굴림" charset="-127"/>
-              </a:rPr>
-              <a:t> </a:t>
-            </a:r>
-            <a:r>
-              <a:rPr lang="en-US" altLang="ko-KR" sz="1800" dirty="0" err="1">
-                <a:solidFill>
-                  <a:schemeClr val="tx2"/>
-                </a:solidFill>
-                <a:latin typeface="Verdana" pitchFamily="34" charset="0"/>
-                <a:ea typeface="굴림" charset="-127"/>
-              </a:rPr>
-              <a:t>nisl</a:t>
-            </a:r>
-            <a:r>
-              <a:rPr lang="en-US" altLang="ko-KR" sz="1800" dirty="0">
-                <a:solidFill>
-                  <a:schemeClr val="tx2"/>
-                </a:solidFill>
-                <a:latin typeface="Verdana" pitchFamily="34" charset="0"/>
-                <a:ea typeface="굴림" charset="-127"/>
-              </a:rPr>
-              <a:t> </a:t>
-            </a:r>
-            <a:r>
-              <a:rPr lang="en-US" altLang="ko-KR" sz="1800" dirty="0" err="1">
-                <a:solidFill>
-                  <a:schemeClr val="tx2"/>
-                </a:solidFill>
-                <a:latin typeface="Verdana" pitchFamily="34" charset="0"/>
-                <a:ea typeface="굴림" charset="-127"/>
-              </a:rPr>
-              <a:t>ut</a:t>
-            </a:r>
-            <a:r>
-              <a:rPr lang="en-US" altLang="ko-KR" sz="1800" dirty="0">
-                <a:solidFill>
-                  <a:schemeClr val="tx2"/>
-                </a:solidFill>
-                <a:latin typeface="Verdana" pitchFamily="34" charset="0"/>
-                <a:ea typeface="굴림" charset="-127"/>
-              </a:rPr>
-              <a:t> </a:t>
-            </a:r>
-            <a:r>
-              <a:rPr lang="en-US" altLang="ko-KR" sz="1800" dirty="0" err="1">
-                <a:solidFill>
-                  <a:schemeClr val="tx2"/>
-                </a:solidFill>
-                <a:latin typeface="Verdana" pitchFamily="34" charset="0"/>
-                <a:ea typeface="굴림" charset="-127"/>
-              </a:rPr>
-              <a:t>aliquip</a:t>
-            </a:r>
-            <a:r>
-              <a:rPr lang="en-US" altLang="ko-KR" sz="1800" dirty="0">
-                <a:solidFill>
-                  <a:schemeClr val="tx2"/>
-                </a:solidFill>
-                <a:latin typeface="Verdana" pitchFamily="34" charset="0"/>
-                <a:ea typeface="굴림" charset="-127"/>
-              </a:rPr>
-              <a:t> ex ea </a:t>
-            </a:r>
-            <a:r>
-              <a:rPr lang="en-US" altLang="ko-KR" sz="1800" dirty="0" err="1">
-                <a:solidFill>
-                  <a:schemeClr val="tx2"/>
-                </a:solidFill>
-                <a:latin typeface="Verdana" pitchFamily="34" charset="0"/>
-                <a:ea typeface="굴림" charset="-127"/>
-              </a:rPr>
-              <a:t>commodo</a:t>
-            </a:r>
-            <a:r>
-              <a:rPr lang="en-US" altLang="ko-KR" sz="1800" dirty="0">
-                <a:solidFill>
-                  <a:schemeClr val="tx2"/>
-                </a:solidFill>
-                <a:latin typeface="Verdana" pitchFamily="34" charset="0"/>
-                <a:ea typeface="굴림" charset="-127"/>
-              </a:rPr>
-              <a:t> </a:t>
-            </a:r>
-            <a:r>
-              <a:rPr lang="en-US" altLang="ko-KR" sz="1800" dirty="0" err="1">
-                <a:solidFill>
-                  <a:schemeClr val="tx2"/>
-                </a:solidFill>
-                <a:latin typeface="Verdana" pitchFamily="34" charset="0"/>
-                <a:ea typeface="굴림" charset="-127"/>
-              </a:rPr>
-              <a:t>consequat</a:t>
-            </a:r>
-            <a:r>
-              <a:rPr lang="en-US" altLang="ko-KR" sz="1800" dirty="0">
-                <a:solidFill>
-                  <a:schemeClr val="tx2"/>
-                </a:solidFill>
-                <a:latin typeface="Verdana" pitchFamily="34" charset="0"/>
-                <a:ea typeface="굴림" charset="-127"/>
-              </a:rPr>
-              <a:t>. </a:t>
-            </a:r>
-          </a:p>
-          <a:p>
-            <a:pPr>
+              <a:t>Projeto Progressão UFBA</a:t>
+            </a:r>
+          </a:p>
+          <a:p>
+            <a:pPr algn="just">
               <a:lnSpc>
                 <a:spcPct val="80000"/>
               </a:lnSpc>
             </a:pPr>
-            <a:endParaRPr lang="en-US" altLang="ko-KR" sz="1800" dirty="0">
-              <a:solidFill>
-                <a:schemeClr val="tx2"/>
-              </a:solidFill>
-              <a:latin typeface="Verdana" pitchFamily="34" charset="0"/>
-              <a:ea typeface="굴림" charset="-127"/>
-            </a:endParaRPr>
-          </a:p>
-          <a:p>
-            <a:pPr>
+            <a:r>
+              <a:rPr lang="pt-BR" sz="2400" dirty="0" smtClean="0">
+                <a:solidFill>
+                  <a:schemeClr val="tx1"/>
+                </a:solidFill>
+              </a:rPr>
+              <a:t>Beneficio</a:t>
+            </a:r>
+          </a:p>
+          <a:p>
+            <a:pPr algn="just">
               <a:lnSpc>
                 <a:spcPct val="80000"/>
               </a:lnSpc>
+              <a:buNone/>
             </a:pPr>
             <a:r>
-              <a:rPr lang="en-US" altLang="ko-KR" sz="1800" dirty="0" err="1">
-                <a:solidFill>
-                  <a:schemeClr val="tx2"/>
-                </a:solidFill>
-                <a:latin typeface="Verdana" pitchFamily="34" charset="0"/>
-                <a:ea typeface="굴림" charset="-127"/>
-              </a:rPr>
-              <a:t>Duis</a:t>
-            </a:r>
-            <a:r>
-              <a:rPr lang="en-US" altLang="ko-KR" sz="1800" dirty="0">
-                <a:solidFill>
-                  <a:schemeClr val="tx2"/>
-                </a:solidFill>
-                <a:latin typeface="Verdana" pitchFamily="34" charset="0"/>
-                <a:ea typeface="굴림" charset="-127"/>
-              </a:rPr>
-              <a:t> </a:t>
-            </a:r>
-            <a:r>
-              <a:rPr lang="en-US" altLang="ko-KR" sz="1800" dirty="0" err="1">
-                <a:solidFill>
-                  <a:schemeClr val="tx2"/>
-                </a:solidFill>
-                <a:latin typeface="Verdana" pitchFamily="34" charset="0"/>
-                <a:ea typeface="굴림" charset="-127"/>
-              </a:rPr>
-              <a:t>autem</a:t>
-            </a:r>
-            <a:r>
-              <a:rPr lang="en-US" altLang="ko-KR" sz="1800" dirty="0">
-                <a:solidFill>
-                  <a:schemeClr val="tx2"/>
-                </a:solidFill>
-                <a:latin typeface="Verdana" pitchFamily="34" charset="0"/>
-                <a:ea typeface="굴림" charset="-127"/>
-              </a:rPr>
-              <a:t> </a:t>
-            </a:r>
-            <a:r>
-              <a:rPr lang="en-US" altLang="ko-KR" sz="1800" dirty="0" err="1">
-                <a:solidFill>
-                  <a:schemeClr val="tx2"/>
-                </a:solidFill>
-                <a:latin typeface="Verdana" pitchFamily="34" charset="0"/>
-                <a:ea typeface="굴림" charset="-127"/>
-              </a:rPr>
-              <a:t>vel</a:t>
-            </a:r>
-            <a:r>
-              <a:rPr lang="en-US" altLang="ko-KR" sz="1800" dirty="0">
-                <a:solidFill>
-                  <a:schemeClr val="tx2"/>
-                </a:solidFill>
-                <a:latin typeface="Verdana" pitchFamily="34" charset="0"/>
-                <a:ea typeface="굴림" charset="-127"/>
-              </a:rPr>
-              <a:t> </a:t>
-            </a:r>
-            <a:r>
-              <a:rPr lang="en-US" altLang="ko-KR" sz="1800" dirty="0" err="1">
-                <a:solidFill>
-                  <a:schemeClr val="tx2"/>
-                </a:solidFill>
-                <a:latin typeface="Verdana" pitchFamily="34" charset="0"/>
-                <a:ea typeface="굴림" charset="-127"/>
-              </a:rPr>
-              <a:t>eum</a:t>
-            </a:r>
-            <a:r>
-              <a:rPr lang="en-US" altLang="ko-KR" sz="1800" dirty="0">
-                <a:solidFill>
-                  <a:schemeClr val="tx2"/>
-                </a:solidFill>
-                <a:latin typeface="Verdana" pitchFamily="34" charset="0"/>
-                <a:ea typeface="굴림" charset="-127"/>
-              </a:rPr>
-              <a:t> </a:t>
-            </a:r>
-            <a:r>
-              <a:rPr lang="en-US" altLang="ko-KR" sz="1800" dirty="0" err="1">
-                <a:solidFill>
-                  <a:schemeClr val="tx2"/>
-                </a:solidFill>
-                <a:latin typeface="Verdana" pitchFamily="34" charset="0"/>
-                <a:ea typeface="굴림" charset="-127"/>
-              </a:rPr>
-              <a:t>iriure</a:t>
-            </a:r>
-            <a:r>
-              <a:rPr lang="en-US" altLang="ko-KR" sz="1800" dirty="0">
-                <a:solidFill>
-                  <a:schemeClr val="tx2"/>
-                </a:solidFill>
-                <a:latin typeface="Verdana" pitchFamily="34" charset="0"/>
-                <a:ea typeface="굴림" charset="-127"/>
-              </a:rPr>
-              <a:t> dolor in </a:t>
-            </a:r>
-            <a:r>
-              <a:rPr lang="en-US" altLang="ko-KR" sz="1800" dirty="0" err="1">
-                <a:solidFill>
-                  <a:schemeClr val="tx2"/>
-                </a:solidFill>
-                <a:latin typeface="Verdana" pitchFamily="34" charset="0"/>
-                <a:ea typeface="굴림" charset="-127"/>
-              </a:rPr>
-              <a:t>hendrerit</a:t>
-            </a:r>
-            <a:r>
-              <a:rPr lang="en-US" altLang="ko-KR" sz="1800" dirty="0">
-                <a:solidFill>
-                  <a:schemeClr val="tx2"/>
-                </a:solidFill>
-                <a:latin typeface="Verdana" pitchFamily="34" charset="0"/>
-                <a:ea typeface="굴림" charset="-127"/>
-              </a:rPr>
-              <a:t> in </a:t>
-            </a:r>
-            <a:r>
-              <a:rPr lang="en-US" altLang="ko-KR" sz="1800" dirty="0" err="1">
-                <a:solidFill>
-                  <a:schemeClr val="tx2"/>
-                </a:solidFill>
-                <a:latin typeface="Verdana" pitchFamily="34" charset="0"/>
-                <a:ea typeface="굴림" charset="-127"/>
-              </a:rPr>
-              <a:t>vulputate</a:t>
-            </a:r>
-            <a:r>
-              <a:rPr lang="en-US" altLang="ko-KR" sz="1800" dirty="0">
-                <a:solidFill>
-                  <a:schemeClr val="tx2"/>
-                </a:solidFill>
-                <a:latin typeface="Verdana" pitchFamily="34" charset="0"/>
-                <a:ea typeface="굴림" charset="-127"/>
-              </a:rPr>
-              <a:t> </a:t>
-            </a:r>
-            <a:r>
-              <a:rPr lang="en-US" altLang="ko-KR" sz="1800" dirty="0" err="1">
-                <a:solidFill>
-                  <a:schemeClr val="tx2"/>
-                </a:solidFill>
-                <a:latin typeface="Verdana" pitchFamily="34" charset="0"/>
-                <a:ea typeface="굴림" charset="-127"/>
-              </a:rPr>
-              <a:t>velit</a:t>
-            </a:r>
-            <a:r>
-              <a:rPr lang="en-US" altLang="ko-KR" sz="1800" dirty="0">
-                <a:solidFill>
-                  <a:schemeClr val="tx2"/>
-                </a:solidFill>
-                <a:latin typeface="Verdana" pitchFamily="34" charset="0"/>
-                <a:ea typeface="굴림" charset="-127"/>
-              </a:rPr>
-              <a:t> </a:t>
-            </a:r>
-            <a:r>
-              <a:rPr lang="en-US" altLang="ko-KR" sz="1800" dirty="0" err="1">
-                <a:solidFill>
-                  <a:schemeClr val="tx2"/>
-                </a:solidFill>
-                <a:latin typeface="Verdana" pitchFamily="34" charset="0"/>
-                <a:ea typeface="굴림" charset="-127"/>
-              </a:rPr>
-              <a:t>esse</a:t>
-            </a:r>
-            <a:r>
-              <a:rPr lang="en-US" altLang="ko-KR" sz="1800" dirty="0">
-                <a:solidFill>
-                  <a:schemeClr val="tx2"/>
-                </a:solidFill>
-                <a:latin typeface="Verdana" pitchFamily="34" charset="0"/>
-                <a:ea typeface="굴림" charset="-127"/>
-              </a:rPr>
-              <a:t> </a:t>
-            </a:r>
-            <a:r>
-              <a:rPr lang="en-US" altLang="ko-KR" sz="1800" dirty="0" err="1">
-                <a:solidFill>
-                  <a:schemeClr val="tx2"/>
-                </a:solidFill>
-                <a:latin typeface="Verdana" pitchFamily="34" charset="0"/>
-                <a:ea typeface="굴림" charset="-127"/>
-              </a:rPr>
-              <a:t>molestie</a:t>
-            </a:r>
-            <a:r>
-              <a:rPr lang="en-US" altLang="ko-KR" sz="1800" dirty="0">
-                <a:solidFill>
-                  <a:schemeClr val="tx2"/>
-                </a:solidFill>
-                <a:latin typeface="Verdana" pitchFamily="34" charset="0"/>
-                <a:ea typeface="굴림" charset="-127"/>
-              </a:rPr>
-              <a:t> </a:t>
-            </a:r>
-            <a:r>
-              <a:rPr lang="en-US" altLang="ko-KR" sz="1800" dirty="0" err="1">
-                <a:solidFill>
-                  <a:schemeClr val="tx2"/>
-                </a:solidFill>
-                <a:latin typeface="Verdana" pitchFamily="34" charset="0"/>
-                <a:ea typeface="굴림" charset="-127"/>
-              </a:rPr>
-              <a:t>consequat</a:t>
-            </a:r>
-            <a:r>
-              <a:rPr lang="en-US" altLang="ko-KR" sz="1800" dirty="0">
-                <a:solidFill>
-                  <a:schemeClr val="tx2"/>
-                </a:solidFill>
-                <a:latin typeface="Verdana" pitchFamily="34" charset="0"/>
-                <a:ea typeface="굴림" charset="-127"/>
-              </a:rPr>
-              <a:t>, </a:t>
-            </a:r>
-            <a:r>
-              <a:rPr lang="en-US" altLang="ko-KR" sz="1800" dirty="0" err="1">
-                <a:solidFill>
-                  <a:schemeClr val="tx2"/>
-                </a:solidFill>
-                <a:latin typeface="Verdana" pitchFamily="34" charset="0"/>
-                <a:ea typeface="굴림" charset="-127"/>
-              </a:rPr>
-              <a:t>vel</a:t>
-            </a:r>
-            <a:r>
-              <a:rPr lang="en-US" altLang="ko-KR" sz="1800" dirty="0">
-                <a:solidFill>
-                  <a:schemeClr val="tx2"/>
-                </a:solidFill>
-                <a:latin typeface="Verdana" pitchFamily="34" charset="0"/>
-                <a:ea typeface="굴림" charset="-127"/>
-              </a:rPr>
-              <a:t> </a:t>
-            </a:r>
-            <a:r>
-              <a:rPr lang="en-US" altLang="ko-KR" sz="1800" dirty="0" err="1">
-                <a:solidFill>
-                  <a:schemeClr val="tx2"/>
-                </a:solidFill>
-                <a:latin typeface="Verdana" pitchFamily="34" charset="0"/>
-                <a:ea typeface="굴림" charset="-127"/>
-              </a:rPr>
-              <a:t>illum</a:t>
-            </a:r>
-            <a:r>
-              <a:rPr lang="en-US" altLang="ko-KR" sz="1800" dirty="0">
-                <a:solidFill>
-                  <a:schemeClr val="tx2"/>
-                </a:solidFill>
-                <a:latin typeface="Verdana" pitchFamily="34" charset="0"/>
-                <a:ea typeface="굴림" charset="-127"/>
-              </a:rPr>
-              <a:t> </a:t>
-            </a:r>
-            <a:r>
-              <a:rPr lang="en-US" altLang="ko-KR" sz="1800" dirty="0" err="1">
-                <a:solidFill>
-                  <a:schemeClr val="tx2"/>
-                </a:solidFill>
-                <a:latin typeface="Verdana" pitchFamily="34" charset="0"/>
-                <a:ea typeface="굴림" charset="-127"/>
-              </a:rPr>
-              <a:t>dolore</a:t>
-            </a:r>
-            <a:r>
-              <a:rPr lang="en-US" altLang="ko-KR" sz="1800" dirty="0">
-                <a:solidFill>
-                  <a:schemeClr val="tx2"/>
-                </a:solidFill>
-                <a:latin typeface="Verdana" pitchFamily="34" charset="0"/>
-                <a:ea typeface="굴림" charset="-127"/>
-              </a:rPr>
-              <a:t> </a:t>
-            </a:r>
-            <a:r>
-              <a:rPr lang="en-US" altLang="ko-KR" sz="1800" dirty="0" err="1">
-                <a:solidFill>
-                  <a:schemeClr val="tx2"/>
-                </a:solidFill>
-                <a:latin typeface="Verdana" pitchFamily="34" charset="0"/>
-                <a:ea typeface="굴림" charset="-127"/>
-              </a:rPr>
-              <a:t>eu</a:t>
-            </a:r>
-            <a:r>
-              <a:rPr lang="en-US" altLang="ko-KR" sz="1800" dirty="0">
-                <a:solidFill>
-                  <a:schemeClr val="tx2"/>
-                </a:solidFill>
-                <a:latin typeface="Verdana" pitchFamily="34" charset="0"/>
-                <a:ea typeface="굴림" charset="-127"/>
-              </a:rPr>
-              <a:t> </a:t>
-            </a:r>
-            <a:r>
-              <a:rPr lang="en-US" altLang="ko-KR" sz="1800" dirty="0" err="1">
-                <a:solidFill>
-                  <a:schemeClr val="tx2"/>
-                </a:solidFill>
-                <a:latin typeface="Verdana" pitchFamily="34" charset="0"/>
-                <a:ea typeface="굴림" charset="-127"/>
-              </a:rPr>
-              <a:t>feugiat</a:t>
-            </a:r>
-            <a:r>
-              <a:rPr lang="en-US" altLang="ko-KR" sz="1800" dirty="0">
-                <a:solidFill>
-                  <a:schemeClr val="tx2"/>
-                </a:solidFill>
-                <a:latin typeface="Verdana" pitchFamily="34" charset="0"/>
-                <a:ea typeface="굴림" charset="-127"/>
-              </a:rPr>
-              <a:t> </a:t>
-            </a:r>
-            <a:r>
-              <a:rPr lang="en-US" altLang="ko-KR" sz="1800" dirty="0" err="1">
-                <a:solidFill>
-                  <a:schemeClr val="tx2"/>
-                </a:solidFill>
-                <a:latin typeface="Verdana" pitchFamily="34" charset="0"/>
-                <a:ea typeface="굴림" charset="-127"/>
-              </a:rPr>
-              <a:t>nulla</a:t>
-            </a:r>
-            <a:r>
-              <a:rPr lang="en-US" altLang="ko-KR" sz="1800" dirty="0">
-                <a:solidFill>
-                  <a:schemeClr val="tx2"/>
-                </a:solidFill>
-                <a:latin typeface="Verdana" pitchFamily="34" charset="0"/>
-                <a:ea typeface="굴림" charset="-127"/>
-              </a:rPr>
-              <a:t> </a:t>
-            </a:r>
-            <a:r>
-              <a:rPr lang="en-US" altLang="ko-KR" sz="1800" dirty="0" err="1">
-                <a:solidFill>
-                  <a:schemeClr val="tx2"/>
-                </a:solidFill>
-                <a:latin typeface="Verdana" pitchFamily="34" charset="0"/>
-                <a:ea typeface="굴림" charset="-127"/>
-              </a:rPr>
-              <a:t>facilisis</a:t>
-            </a:r>
-            <a:r>
-              <a:rPr lang="en-US" altLang="ko-KR" sz="1800" dirty="0">
-                <a:solidFill>
-                  <a:schemeClr val="tx2"/>
-                </a:solidFill>
-                <a:latin typeface="Verdana" pitchFamily="34" charset="0"/>
-                <a:ea typeface="굴림" charset="-127"/>
-              </a:rPr>
-              <a:t> at </a:t>
-            </a:r>
-            <a:r>
-              <a:rPr lang="en-US" altLang="ko-KR" sz="1800" dirty="0" err="1">
-                <a:solidFill>
-                  <a:schemeClr val="tx2"/>
-                </a:solidFill>
-                <a:latin typeface="Verdana" pitchFamily="34" charset="0"/>
-                <a:ea typeface="굴림" charset="-127"/>
-              </a:rPr>
-              <a:t>vero</a:t>
-            </a:r>
-            <a:r>
-              <a:rPr lang="en-US" altLang="ko-KR" sz="1800" dirty="0">
-                <a:solidFill>
-                  <a:schemeClr val="tx2"/>
-                </a:solidFill>
-                <a:latin typeface="Verdana" pitchFamily="34" charset="0"/>
-                <a:ea typeface="굴림" charset="-127"/>
-              </a:rPr>
-              <a:t> </a:t>
-            </a:r>
-            <a:r>
-              <a:rPr lang="en-US" altLang="ko-KR" sz="1800" dirty="0" err="1">
-                <a:solidFill>
-                  <a:schemeClr val="tx2"/>
-                </a:solidFill>
-                <a:latin typeface="Verdana" pitchFamily="34" charset="0"/>
-                <a:ea typeface="굴림" charset="-127"/>
-              </a:rPr>
-              <a:t>eros</a:t>
-            </a:r>
-            <a:r>
-              <a:rPr lang="en-US" altLang="ko-KR" sz="1800" dirty="0">
-                <a:solidFill>
-                  <a:schemeClr val="tx2"/>
-                </a:solidFill>
-                <a:latin typeface="Verdana" pitchFamily="34" charset="0"/>
-                <a:ea typeface="굴림" charset="-127"/>
-              </a:rPr>
-              <a:t> et </a:t>
-            </a:r>
-            <a:r>
-              <a:rPr lang="en-US" altLang="ko-KR" sz="1800" dirty="0" err="1">
-                <a:solidFill>
-                  <a:schemeClr val="tx2"/>
-                </a:solidFill>
-                <a:latin typeface="Verdana" pitchFamily="34" charset="0"/>
-                <a:ea typeface="굴림" charset="-127"/>
-              </a:rPr>
-              <a:t>accumsan</a:t>
-            </a:r>
-            <a:r>
-              <a:rPr lang="en-US" altLang="ko-KR" sz="1800" dirty="0">
-                <a:solidFill>
-                  <a:schemeClr val="tx2"/>
-                </a:solidFill>
-                <a:latin typeface="Verdana" pitchFamily="34" charset="0"/>
-                <a:ea typeface="굴림" charset="-127"/>
-              </a:rPr>
-              <a:t> et </a:t>
-            </a:r>
-            <a:r>
-              <a:rPr lang="en-US" altLang="ko-KR" sz="1800" dirty="0" err="1">
-                <a:solidFill>
-                  <a:schemeClr val="tx2"/>
-                </a:solidFill>
-                <a:latin typeface="Verdana" pitchFamily="34" charset="0"/>
-                <a:ea typeface="굴림" charset="-127"/>
-              </a:rPr>
-              <a:t>iusto</a:t>
-            </a:r>
-            <a:r>
-              <a:rPr lang="en-US" altLang="ko-KR" sz="1800" dirty="0">
-                <a:solidFill>
-                  <a:schemeClr val="tx2"/>
-                </a:solidFill>
-                <a:latin typeface="Verdana" pitchFamily="34" charset="0"/>
-                <a:ea typeface="굴림" charset="-127"/>
-              </a:rPr>
-              <a:t> </a:t>
-            </a:r>
-            <a:r>
-              <a:rPr lang="en-US" altLang="ko-KR" sz="1800" dirty="0" err="1">
-                <a:solidFill>
-                  <a:schemeClr val="tx2"/>
-                </a:solidFill>
-                <a:latin typeface="Verdana" pitchFamily="34" charset="0"/>
-                <a:ea typeface="굴림" charset="-127"/>
-              </a:rPr>
-              <a:t>odio</a:t>
-            </a:r>
-            <a:r>
-              <a:rPr lang="en-US" altLang="ko-KR" sz="1800" dirty="0">
-                <a:solidFill>
-                  <a:schemeClr val="tx2"/>
-                </a:solidFill>
-                <a:latin typeface="Verdana" pitchFamily="34" charset="0"/>
-                <a:ea typeface="굴림" charset="-127"/>
-              </a:rPr>
-              <a:t> </a:t>
-            </a:r>
-            <a:r>
-              <a:rPr lang="en-US" altLang="ko-KR" sz="1800" dirty="0" err="1">
-                <a:solidFill>
-                  <a:schemeClr val="tx2"/>
-                </a:solidFill>
-                <a:latin typeface="Verdana" pitchFamily="34" charset="0"/>
-                <a:ea typeface="굴림" charset="-127"/>
-              </a:rPr>
-              <a:t>dignissim</a:t>
-            </a:r>
-            <a:r>
-              <a:rPr lang="en-US" altLang="ko-KR" sz="1800" dirty="0">
-                <a:solidFill>
-                  <a:schemeClr val="tx2"/>
-                </a:solidFill>
-                <a:latin typeface="Verdana" pitchFamily="34" charset="0"/>
-                <a:ea typeface="굴림" charset="-127"/>
-              </a:rPr>
-              <a:t> qui </a:t>
-            </a:r>
-            <a:r>
-              <a:rPr lang="en-US" altLang="ko-KR" sz="1800" dirty="0" err="1">
-                <a:solidFill>
-                  <a:schemeClr val="tx2"/>
-                </a:solidFill>
-                <a:latin typeface="Verdana" pitchFamily="34" charset="0"/>
-                <a:ea typeface="굴림" charset="-127"/>
-              </a:rPr>
-              <a:t>blandit</a:t>
-            </a:r>
-            <a:r>
-              <a:rPr lang="en-US" altLang="ko-KR" sz="1800" dirty="0">
-                <a:solidFill>
-                  <a:schemeClr val="tx2"/>
-                </a:solidFill>
-                <a:latin typeface="Verdana" pitchFamily="34" charset="0"/>
-                <a:ea typeface="굴림" charset="-127"/>
-              </a:rPr>
-              <a:t> </a:t>
-            </a:r>
-            <a:r>
-              <a:rPr lang="en-US" altLang="ko-KR" sz="1800" dirty="0" err="1">
-                <a:solidFill>
-                  <a:schemeClr val="tx2"/>
-                </a:solidFill>
-                <a:latin typeface="Verdana" pitchFamily="34" charset="0"/>
-                <a:ea typeface="굴림" charset="-127"/>
-              </a:rPr>
-              <a:t>praesent</a:t>
-            </a:r>
-            <a:r>
-              <a:rPr lang="en-US" altLang="ko-KR" sz="1800" dirty="0">
-                <a:solidFill>
-                  <a:schemeClr val="tx2"/>
-                </a:solidFill>
-                <a:latin typeface="Verdana" pitchFamily="34" charset="0"/>
-                <a:ea typeface="굴림" charset="-127"/>
-              </a:rPr>
-              <a:t> </a:t>
-            </a:r>
-            <a:r>
-              <a:rPr lang="en-US" altLang="ko-KR" sz="1800" dirty="0" err="1">
-                <a:solidFill>
-                  <a:schemeClr val="tx2"/>
-                </a:solidFill>
-                <a:latin typeface="Verdana" pitchFamily="34" charset="0"/>
-                <a:ea typeface="굴림" charset="-127"/>
-              </a:rPr>
-              <a:t>luptatum</a:t>
-            </a:r>
-            <a:r>
-              <a:rPr lang="en-US" altLang="ko-KR" sz="1800" dirty="0">
-                <a:solidFill>
-                  <a:schemeClr val="tx2"/>
-                </a:solidFill>
-                <a:latin typeface="Verdana" pitchFamily="34" charset="0"/>
-                <a:ea typeface="굴림" charset="-127"/>
-              </a:rPr>
-              <a:t> </a:t>
-            </a:r>
-            <a:r>
-              <a:rPr lang="en-US" altLang="ko-KR" sz="1800" dirty="0" err="1">
-                <a:solidFill>
-                  <a:schemeClr val="tx2"/>
-                </a:solidFill>
-                <a:latin typeface="Verdana" pitchFamily="34" charset="0"/>
-                <a:ea typeface="굴림" charset="-127"/>
-              </a:rPr>
-              <a:t>zzril</a:t>
-            </a:r>
-            <a:r>
-              <a:rPr lang="en-US" altLang="ko-KR" sz="1800" dirty="0">
-                <a:solidFill>
-                  <a:schemeClr val="tx2"/>
-                </a:solidFill>
-                <a:latin typeface="Verdana" pitchFamily="34" charset="0"/>
-                <a:ea typeface="굴림" charset="-127"/>
-              </a:rPr>
-              <a:t> </a:t>
-            </a:r>
-            <a:r>
-              <a:rPr lang="en-US" altLang="ko-KR" sz="1800" dirty="0" err="1">
-                <a:solidFill>
-                  <a:schemeClr val="tx2"/>
-                </a:solidFill>
-                <a:latin typeface="Verdana" pitchFamily="34" charset="0"/>
-                <a:ea typeface="굴림" charset="-127"/>
-              </a:rPr>
-              <a:t>delenit</a:t>
-            </a:r>
-            <a:r>
-              <a:rPr lang="en-US" altLang="ko-KR" sz="1800" dirty="0">
-                <a:solidFill>
-                  <a:schemeClr val="tx2"/>
-                </a:solidFill>
-                <a:latin typeface="Verdana" pitchFamily="34" charset="0"/>
-                <a:ea typeface="굴림" charset="-127"/>
-              </a:rPr>
-              <a:t> </a:t>
-            </a:r>
-            <a:r>
-              <a:rPr lang="en-US" altLang="ko-KR" sz="1800" dirty="0" err="1">
-                <a:solidFill>
-                  <a:schemeClr val="tx2"/>
-                </a:solidFill>
-                <a:latin typeface="Verdana" pitchFamily="34" charset="0"/>
-                <a:ea typeface="굴림" charset="-127"/>
-              </a:rPr>
-              <a:t>augue</a:t>
-            </a:r>
-            <a:r>
-              <a:rPr lang="en-US" altLang="ko-KR" sz="1800" dirty="0">
-                <a:solidFill>
-                  <a:schemeClr val="tx2"/>
-                </a:solidFill>
-                <a:latin typeface="Verdana" pitchFamily="34" charset="0"/>
-                <a:ea typeface="굴림" charset="-127"/>
-              </a:rPr>
-              <a:t> </a:t>
-            </a:r>
-            <a:r>
-              <a:rPr lang="en-US" altLang="ko-KR" sz="1800" dirty="0" err="1">
-                <a:solidFill>
-                  <a:schemeClr val="tx2"/>
-                </a:solidFill>
-                <a:latin typeface="Verdana" pitchFamily="34" charset="0"/>
-                <a:ea typeface="굴림" charset="-127"/>
-              </a:rPr>
-              <a:t>duis</a:t>
-            </a:r>
-            <a:r>
-              <a:rPr lang="en-US" altLang="ko-KR" sz="1800" dirty="0">
-                <a:solidFill>
-                  <a:schemeClr val="tx2"/>
-                </a:solidFill>
-                <a:latin typeface="Verdana" pitchFamily="34" charset="0"/>
-                <a:ea typeface="굴림" charset="-127"/>
-              </a:rPr>
-              <a:t> </a:t>
-            </a:r>
-            <a:r>
-              <a:rPr lang="en-US" altLang="ko-KR" sz="1800" dirty="0" err="1">
-                <a:solidFill>
-                  <a:schemeClr val="tx2"/>
-                </a:solidFill>
-                <a:latin typeface="Verdana" pitchFamily="34" charset="0"/>
-                <a:ea typeface="굴림" charset="-127"/>
-              </a:rPr>
-              <a:t>dolore</a:t>
-            </a:r>
-            <a:r>
-              <a:rPr lang="en-US" altLang="ko-KR" sz="1800" dirty="0">
-                <a:solidFill>
-                  <a:schemeClr val="tx2"/>
-                </a:solidFill>
-                <a:latin typeface="Verdana" pitchFamily="34" charset="0"/>
-                <a:ea typeface="굴림" charset="-127"/>
-              </a:rPr>
-              <a:t> </a:t>
-            </a:r>
-            <a:r>
-              <a:rPr lang="en-US" altLang="ko-KR" sz="1800" dirty="0" err="1">
-                <a:solidFill>
-                  <a:schemeClr val="tx2"/>
-                </a:solidFill>
-                <a:latin typeface="Verdana" pitchFamily="34" charset="0"/>
-                <a:ea typeface="굴림" charset="-127"/>
-              </a:rPr>
-              <a:t>te</a:t>
-            </a:r>
-            <a:r>
-              <a:rPr lang="en-US" altLang="ko-KR" sz="1800" dirty="0">
-                <a:solidFill>
-                  <a:schemeClr val="tx2"/>
-                </a:solidFill>
-                <a:latin typeface="Verdana" pitchFamily="34" charset="0"/>
-                <a:ea typeface="굴림" charset="-127"/>
-              </a:rPr>
-              <a:t> </a:t>
-            </a:r>
-            <a:r>
-              <a:rPr lang="en-US" altLang="ko-KR" sz="1800" dirty="0" err="1">
-                <a:solidFill>
-                  <a:schemeClr val="tx2"/>
-                </a:solidFill>
-                <a:latin typeface="Verdana" pitchFamily="34" charset="0"/>
-                <a:ea typeface="굴림" charset="-127"/>
-              </a:rPr>
-              <a:t>feugait</a:t>
-            </a:r>
-            <a:r>
-              <a:rPr lang="en-US" altLang="ko-KR" sz="1800" dirty="0">
-                <a:solidFill>
-                  <a:schemeClr val="tx2"/>
-                </a:solidFill>
-                <a:latin typeface="Verdana" pitchFamily="34" charset="0"/>
-                <a:ea typeface="굴림" charset="-127"/>
-              </a:rPr>
-              <a:t> </a:t>
-            </a:r>
-            <a:r>
-              <a:rPr lang="en-US" altLang="ko-KR" sz="1800" dirty="0" err="1">
-                <a:solidFill>
-                  <a:schemeClr val="tx2"/>
-                </a:solidFill>
-                <a:latin typeface="Verdana" pitchFamily="34" charset="0"/>
-                <a:ea typeface="굴림" charset="-127"/>
-              </a:rPr>
-              <a:t>nulla</a:t>
-            </a:r>
-            <a:r>
-              <a:rPr lang="en-US" altLang="ko-KR" sz="1800" dirty="0">
-                <a:solidFill>
-                  <a:schemeClr val="tx2"/>
-                </a:solidFill>
-                <a:latin typeface="Verdana" pitchFamily="34" charset="0"/>
-                <a:ea typeface="굴림" charset="-127"/>
-              </a:rPr>
-              <a:t> </a:t>
-            </a:r>
-            <a:r>
-              <a:rPr lang="en-US" altLang="ko-KR" sz="1800" dirty="0" err="1">
-                <a:solidFill>
-                  <a:schemeClr val="tx2"/>
-                </a:solidFill>
-                <a:latin typeface="Verdana" pitchFamily="34" charset="0"/>
-                <a:ea typeface="굴림" charset="-127"/>
-              </a:rPr>
-              <a:t>facilisi</a:t>
-            </a:r>
-            <a:r>
-              <a:rPr lang="en-US" altLang="ko-KR" sz="1800" dirty="0">
-                <a:solidFill>
-                  <a:schemeClr val="tx2"/>
-                </a:solidFill>
-                <a:latin typeface="Verdana" pitchFamily="34" charset="0"/>
-                <a:ea typeface="굴림" charset="-127"/>
-              </a:rPr>
-              <a:t>.</a:t>
-            </a:r>
-            <a:endParaRPr lang="en-US" sz="1800" dirty="0">
-              <a:solidFill>
-                <a:schemeClr val="tx2"/>
-              </a:solidFill>
-            </a:endParaRPr>
-          </a:p>
-          <a:p>
-            <a:pPr>
-              <a:lnSpc>
-                <a:spcPct val="80000"/>
-              </a:lnSpc>
-            </a:pPr>
+              <a:rPr lang="pt-BR" sz="1800" dirty="0" smtClean="0"/>
+              <a:t>. </a:t>
+            </a:r>
             <a:endParaRPr lang="en-US" sz="1800" dirty="0">
               <a:solidFill>
                 <a:schemeClr val="tx2"/>
@@ -5854,6 +4466,259 @@
 <file path=ppt/slides/slide6.xml><?xml version="1.0" encoding="utf-8"?>
 <p:sld xmlns:a="http://schemas.openxmlformats.org/drawingml/2006/main" xmlns:r="http://schemas.openxmlformats.org/officeDocument/2006/relationships" xmlns:p="http://schemas.openxmlformats.org/presentationml/2006/main">
   <p:cSld>
+    <p:bg>
+      <p:bgPr>
+        <a:blipFill dpi="0" rotWithShape="0">
+          <a:blip r:embed="rId3" cstate="print">
+            <a:lum/>
+          </a:blip>
+          <a:srcRect/>
+          <a:stretch>
+            <a:fillRect l="-2000" r="-2000"/>
+          </a:stretch>
+        </a:blipFill>
+        <a:effectLst/>
+      </p:bgPr>
+    </p:bg>
+    <p:spTree>
+      <p:nvGrpSpPr>
+        <p:cNvPr id="1" name=""/>
+        <p:cNvGrpSpPr/>
+        <p:nvPr/>
+      </p:nvGrpSpPr>
+      <p:grpSpPr>
+        <a:xfrm>
+          <a:off x="0" y="0"/>
+          <a:ext cx="0" cy="0"/>
+          <a:chOff x="0" y="0"/>
+          <a:chExt cx="0" cy="0"/>
+        </a:xfrm>
+      </p:grpSpPr>
+      <p:sp>
+        <p:nvSpPr>
+          <p:cNvPr id="60418" name="Rectangle 2"/>
+          <p:cNvSpPr>
+            <a:spLocks noGrp="1" noChangeArrowheads="1"/>
+          </p:cNvSpPr>
+          <p:nvPr>
+            <p:ph type="title"/>
+          </p:nvPr>
+        </p:nvSpPr>
+        <p:spPr>
+          <a:xfrm>
+            <a:off x="1981200" y="762000"/>
+            <a:ext cx="6934200" cy="715963"/>
+          </a:xfrm>
+        </p:spPr>
+        <p:txBody>
+          <a:bodyPr/>
+          <a:lstStyle/>
+          <a:p>
+            <a:r>
+              <a:rPr lang="en-US" dirty="0" err="1" smtClean="0">
+                <a:solidFill>
+                  <a:schemeClr val="tx2"/>
+                </a:solidFill>
+              </a:rPr>
+              <a:t>Benefícios</a:t>
+            </a:r>
+            <a:r>
+              <a:rPr lang="en-US" dirty="0" smtClean="0">
+                <a:solidFill>
+                  <a:schemeClr val="tx2"/>
+                </a:solidFill>
+              </a:rPr>
+              <a:t> </a:t>
+            </a:r>
+            <a:r>
+              <a:rPr lang="en-US" dirty="0" err="1" smtClean="0">
+                <a:solidFill>
+                  <a:schemeClr val="tx2"/>
+                </a:solidFill>
+              </a:rPr>
+              <a:t>Esperado</a:t>
+            </a:r>
+            <a:endParaRPr lang="en-US" dirty="0">
+              <a:solidFill>
+                <a:schemeClr val="tx2"/>
+              </a:solidFill>
+            </a:endParaRPr>
+          </a:p>
+        </p:txBody>
+      </p:sp>
+      <p:sp>
+        <p:nvSpPr>
+          <p:cNvPr id="60419" name="Rectangle 3"/>
+          <p:cNvSpPr>
+            <a:spLocks noGrp="1" noChangeArrowheads="1"/>
+          </p:cNvSpPr>
+          <p:nvPr>
+            <p:ph idx="1"/>
+          </p:nvPr>
+        </p:nvSpPr>
+        <p:spPr>
+          <a:xfrm>
+            <a:off x="1981200" y="1981200"/>
+            <a:ext cx="6934200" cy="4688160"/>
+          </a:xfrm>
+        </p:spPr>
+        <p:txBody>
+          <a:bodyPr/>
+          <a:lstStyle/>
+          <a:p>
+            <a:pPr>
+              <a:buNone/>
+            </a:pPr>
+            <a:r>
+              <a:rPr lang="pt-BR" sz="1800" dirty="0" smtClean="0">
+                <a:solidFill>
+                  <a:schemeClr val="tx1"/>
+                </a:solidFill>
+              </a:rPr>
+              <a:t>Evitar o trabalho manual e a perda de tempo dos docentes no </a:t>
+            </a:r>
+            <a:r>
+              <a:rPr lang="pt-BR" sz="1800" dirty="0" smtClean="0">
+                <a:solidFill>
+                  <a:schemeClr val="tx1"/>
+                </a:solidFill>
+              </a:rPr>
+              <a:t>final</a:t>
+            </a:r>
+          </a:p>
+          <a:p>
+            <a:pPr>
+              <a:buNone/>
+            </a:pPr>
+            <a:r>
+              <a:rPr lang="pt-BR" sz="1800" dirty="0" smtClean="0">
+                <a:solidFill>
+                  <a:schemeClr val="tx1"/>
+                </a:solidFill>
+              </a:rPr>
+              <a:t>do </a:t>
+            </a:r>
+            <a:r>
+              <a:rPr lang="pt-BR" sz="1800" dirty="0" smtClean="0">
+                <a:solidFill>
+                  <a:schemeClr val="tx1"/>
+                </a:solidFill>
+              </a:rPr>
+              <a:t>semestre, ao ter que minerar e preencher informações </a:t>
+            </a:r>
+            <a:r>
+              <a:rPr lang="pt-BR" sz="1800" dirty="0" smtClean="0">
+                <a:solidFill>
+                  <a:schemeClr val="tx1"/>
+                </a:solidFill>
+              </a:rPr>
+              <a:t>em</a:t>
+            </a:r>
+          </a:p>
+          <a:p>
+            <a:pPr>
+              <a:buNone/>
+            </a:pPr>
+            <a:r>
+              <a:rPr lang="pt-BR" sz="1800" dirty="0" smtClean="0">
+                <a:solidFill>
+                  <a:schemeClr val="tx1"/>
+                </a:solidFill>
+              </a:rPr>
+              <a:t>formulários</a:t>
+            </a:r>
+            <a:r>
+              <a:rPr lang="pt-BR" sz="1800" dirty="0" smtClean="0">
+                <a:solidFill>
+                  <a:schemeClr val="tx1"/>
+                </a:solidFill>
+              </a:rPr>
+              <a:t>. O software além de minerar as informações </a:t>
+            </a:r>
+            <a:r>
+              <a:rPr lang="pt-BR" sz="1800" dirty="0" smtClean="0">
+                <a:solidFill>
+                  <a:schemeClr val="tx1"/>
+                </a:solidFill>
+              </a:rPr>
+              <a:t>também</a:t>
+            </a:r>
+          </a:p>
+          <a:p>
+            <a:pPr>
+              <a:buNone/>
+            </a:pPr>
+            <a:r>
+              <a:rPr lang="pt-BR" sz="1800" dirty="0" smtClean="0">
+                <a:solidFill>
+                  <a:schemeClr val="tx1"/>
+                </a:solidFill>
+              </a:rPr>
+              <a:t>mostrará </a:t>
+            </a:r>
+            <a:r>
+              <a:rPr lang="pt-BR" sz="1800" dirty="0" smtClean="0">
+                <a:solidFill>
+                  <a:schemeClr val="tx1"/>
+                </a:solidFill>
+              </a:rPr>
+              <a:t>a previa dos dados antes de devolvê-los </a:t>
+            </a:r>
+            <a:r>
+              <a:rPr lang="pt-BR" sz="1800" dirty="0" smtClean="0">
+                <a:solidFill>
+                  <a:schemeClr val="tx1"/>
+                </a:solidFill>
+              </a:rPr>
+              <a:t>devidamente</a:t>
+            </a:r>
+          </a:p>
+          <a:p>
+            <a:pPr>
+              <a:buNone/>
+            </a:pPr>
+            <a:r>
+              <a:rPr lang="pt-BR" sz="1800" dirty="0" smtClean="0">
+                <a:solidFill>
+                  <a:schemeClr val="tx1"/>
+                </a:solidFill>
+              </a:rPr>
+              <a:t>tratados</a:t>
+            </a:r>
+            <a:r>
+              <a:rPr lang="pt-BR" sz="1800" dirty="0" smtClean="0">
+                <a:solidFill>
+                  <a:schemeClr val="tx1"/>
+                </a:solidFill>
+              </a:rPr>
+              <a:t>. </a:t>
+            </a:r>
+            <a:endParaRPr lang="en-US" sz="1800" dirty="0">
+              <a:solidFill>
+                <a:schemeClr val="tx1"/>
+              </a:solidFill>
+            </a:endParaRPr>
+          </a:p>
+        </p:txBody>
+      </p:sp>
+    </p:spTree>
+  </p:cSld>
+  <p:clrMapOvr>
+    <a:masterClrMapping/>
+  </p:clrMapOvr>
+  <p:timing>
+    <p:tnLst>
+      <p:par>
+        <p:cTn id="1" dur="indefinite" restart="never" nodeType="tmRoot"/>
+      </p:par>
+    </p:tnLst>
+  </p:timing>
+</p:sld>
+</file>
+
+<file path=ppt/slides/slide7.xml><?xml version="1.0" encoding="utf-8"?>
+<p:sld xmlns:a="http://schemas.openxmlformats.org/drawingml/2006/main" xmlns:r="http://schemas.openxmlformats.org/officeDocument/2006/relationships" xmlns:p="http://schemas.openxmlformats.org/presentationml/2006/main">
+  <p:cSld>
     <p:spTree>
       <p:nvGrpSpPr>
         <p:cNvPr id="1" name=""/>
@@ -5938,7 +4803,7 @@
 </p:sld>
 </file>
 
-<file path=ppt/slides/slide7.xml><?xml version="1.0" encoding="utf-8"?>
+<file path=ppt/slides/slide8.xml><?xml version="1.0" encoding="utf-8"?>
 <p:sld xmlns:a="http://schemas.openxmlformats.org/drawingml/2006/main" xmlns:r="http://schemas.openxmlformats.org/officeDocument/2006/relationships" xmlns:p="http://schemas.openxmlformats.org/presentationml/2006/main">
   <p:cSld>
     <p:bg>
@@ -6044,7 +4909,7 @@
 </p:sld>
 </file>
 
-<file path=ppt/slides/slide8.xml><?xml version="1.0" encoding="utf-8"?>
+<file path=ppt/slides/slide9.xml><?xml version="1.0" encoding="utf-8"?>
 <p:sld xmlns:a="http://schemas.openxmlformats.org/drawingml/2006/main" xmlns:r="http://schemas.openxmlformats.org/officeDocument/2006/relationships" xmlns:p="http://schemas.openxmlformats.org/presentationml/2006/main">
   <p:cSld>
     <p:spTree>
@@ -6110,112 +4975,6 @@
           <a:xfrm>
             <a:off x="2555775" y="1444139"/>
             <a:ext cx="4873367" cy="4797559"/>
-          </a:xfrm>
-          <a:prstGeom prst="rect">
-            <a:avLst/>
-          </a:prstGeom>
-        </p:spPr>
-      </p:pic>
-    </p:spTree>
-  </p:cSld>
-  <p:clrMapOvr>
-    <a:masterClrMapping/>
-  </p:clrMapOvr>
-  <p:timing>
-    <p:tnLst>
-      <p:par>
-        <p:cTn id="1" dur="indefinite" restart="never" nodeType="tmRoot"/>
-      </p:par>
-    </p:tnLst>
-  </p:timing>
-</p:sld>
-</file>
-
-<file path=ppt/slides/slide9.xml><?xml version="1.0" encoding="utf-8"?>
-<p:sld xmlns:a="http://schemas.openxmlformats.org/drawingml/2006/main" xmlns:r="http://schemas.openxmlformats.org/officeDocument/2006/relationships" xmlns:p="http://schemas.openxmlformats.org/presentationml/2006/main">
-  <p:cSld>
-    <p:bg>
-      <p:bgPr>
-        <a:blipFill dpi="0" rotWithShape="0">
-          <a:blip r:embed="rId3" cstate="print">
-            <a:lum/>
-          </a:blip>
-          <a:srcRect/>
-          <a:stretch>
-            <a:fillRect/>
-          </a:stretch>
-        </a:blipFill>
-        <a:effectLst/>
-      </p:bgPr>
-    </p:bg>
-    <p:spTree>
-      <p:nvGrpSpPr>
-        <p:cNvPr id="1" name=""/>
-        <p:cNvGrpSpPr/>
-        <p:nvPr/>
-      </p:nvGrpSpPr>
-      <p:grpSpPr>
-        <a:xfrm>
-          <a:off x="0" y="0"/>
-          <a:ext cx="0" cy="0"/>
-          <a:chOff x="0" y="0"/>
-          <a:chExt cx="0" cy="0"/>
-        </a:xfrm>
-      </p:grpSpPr>
-      <p:sp>
-        <p:nvSpPr>
-          <p:cNvPr id="60418" name="Rectangle 2"/>
-          <p:cNvSpPr>
-            <a:spLocks noGrp="1" noChangeArrowheads="1"/>
-          </p:cNvSpPr>
-          <p:nvPr>
-            <p:ph type="title"/>
-          </p:nvPr>
-        </p:nvSpPr>
-        <p:spPr>
-          <a:xfrm>
-            <a:off x="1981200" y="762000"/>
-            <a:ext cx="6934200" cy="715963"/>
-          </a:xfrm>
-        </p:spPr>
-        <p:txBody>
-          <a:bodyPr/>
-          <a:lstStyle/>
-          <a:p>
-            <a:r>
-              <a:rPr lang="en-US" dirty="0" err="1" smtClean="0">
-                <a:solidFill>
-                  <a:schemeClr val="tx2"/>
-                </a:solidFill>
-              </a:rPr>
-              <a:t>Configuração</a:t>
-            </a:r>
-            <a:endParaRPr lang="en-US" dirty="0">
-              <a:solidFill>
-                <a:schemeClr val="tx2"/>
-              </a:solidFill>
-            </a:endParaRPr>
-          </a:p>
-        </p:txBody>
-      </p:sp>
-      <p:pic>
-        <p:nvPicPr>
-          <p:cNvPr id="4" name="Imagem 3" descr="github-1024-black.png"/>
-          <p:cNvPicPr>
-            <a:picLocks noChangeAspect="1"/>
-          </p:cNvPicPr>
-          <p:nvPr/>
-        </p:nvPicPr>
-        <p:blipFill>
-          <a:blip r:embed="rId4" cstate="print"/>
-          <a:stretch>
-            <a:fillRect/>
-          </a:stretch>
-        </p:blipFill>
-        <p:spPr>
-          <a:xfrm>
-            <a:off x="3707904" y="1628800"/>
-            <a:ext cx="4896544" cy="4896544"/>
           </a:xfrm>
           <a:prstGeom prst="rect">
             <a:avLst/>

</xml_diff>